<commit_message>
Adicionando dados da turma
Adicionando dados da turma
</commit_message>
<xml_diff>
--- a/Documentacao/FIAP-QualidProjSW-Aula-4-GIT - EXERCICIOS.pptx
+++ b/Documentacao/FIAP-QualidProjSW-Aula-4-GIT - EXERCICIOS.pptx
@@ -210,7 +210,7 @@
           <a:p>
             <a:fld id="{B6D4C934-FEA0-426E-B081-61FE807EA637}" type="datetimeFigureOut">
               <a:rPr lang="pt-BR" smtClean="0"/>
-              <a:t>10/02/2020</a:t>
+              <a:t>05/03/2020</a:t>
             </a:fld>
             <a:endParaRPr lang="pt-BR"/>
           </a:p>
@@ -368,7 +368,7 @@
           <a:p>
             <a:fld id="{F69DE88B-C5FB-4190-8CD8-D803F1201C56}" type="slidenum">
               <a:rPr lang="pt-BR" smtClean="0"/>
-              <a:t>‹nº›</a:t>
+              <a:t>‹#›</a:t>
             </a:fld>
             <a:endParaRPr lang="pt-BR"/>
           </a:p>
@@ -1052,7 +1052,7 @@
           <a:p>
             <a:fld id="{89C4B140-6DEB-45EB-A5FE-2FE213A19AB6}" type="datetimeFigureOut">
               <a:rPr lang="pt-BR" smtClean="0"/>
-              <a:t>10/02/2020</a:t>
+              <a:t>05/03/2020</a:t>
             </a:fld>
             <a:endParaRPr lang="pt-BR"/>
           </a:p>
@@ -1110,7 +1110,7 @@
           <a:p>
             <a:fld id="{1BC5D9AF-0A3A-46C6-9823-3468E6F7B9BB}" type="slidenum">
               <a:rPr lang="pt-BR" smtClean="0"/>
-              <a:t>‹nº›</a:t>
+              <a:t>‹#›</a:t>
             </a:fld>
             <a:endParaRPr lang="pt-BR"/>
           </a:p>
@@ -1260,7 +1260,7 @@
           <a:p>
             <a:fld id="{89C4B140-6DEB-45EB-A5FE-2FE213A19AB6}" type="datetimeFigureOut">
               <a:rPr lang="pt-BR" smtClean="0"/>
-              <a:t>10/02/2020</a:t>
+              <a:t>05/03/2020</a:t>
             </a:fld>
             <a:endParaRPr lang="pt-BR"/>
           </a:p>
@@ -1318,7 +1318,7 @@
           <a:p>
             <a:fld id="{1BC5D9AF-0A3A-46C6-9823-3468E6F7B9BB}" type="slidenum">
               <a:rPr lang="pt-BR" smtClean="0"/>
-              <a:t>‹nº›</a:t>
+              <a:t>‹#›</a:t>
             </a:fld>
             <a:endParaRPr lang="pt-BR"/>
           </a:p>
@@ -1468,7 +1468,7 @@
           <a:p>
             <a:fld id="{89C4B140-6DEB-45EB-A5FE-2FE213A19AB6}" type="datetimeFigureOut">
               <a:rPr lang="pt-BR" smtClean="0"/>
-              <a:t>10/02/2020</a:t>
+              <a:t>05/03/2020</a:t>
             </a:fld>
             <a:endParaRPr lang="pt-BR"/>
           </a:p>
@@ -1526,7 +1526,7 @@
           <a:p>
             <a:fld id="{1BC5D9AF-0A3A-46C6-9823-3468E6F7B9BB}" type="slidenum">
               <a:rPr lang="pt-BR" smtClean="0"/>
-              <a:t>‹nº›</a:t>
+              <a:t>‹#›</a:t>
             </a:fld>
             <a:endParaRPr lang="pt-BR"/>
           </a:p>
@@ -1724,7 +1724,7 @@
               <a:pPr>
                 <a:defRPr/>
               </a:pPr>
-              <a:t>‹nº›</a:t>
+              <a:t>‹#›</a:t>
             </a:fld>
             <a:endParaRPr lang="pt-BR"/>
           </a:p>
@@ -1874,7 +1874,7 @@
           <a:p>
             <a:fld id="{89C4B140-6DEB-45EB-A5FE-2FE213A19AB6}" type="datetimeFigureOut">
               <a:rPr lang="pt-BR" smtClean="0"/>
-              <a:t>10/02/2020</a:t>
+              <a:t>05/03/2020</a:t>
             </a:fld>
             <a:endParaRPr lang="pt-BR"/>
           </a:p>
@@ -1932,7 +1932,7 @@
           <a:p>
             <a:fld id="{1BC5D9AF-0A3A-46C6-9823-3468E6F7B9BB}" type="slidenum">
               <a:rPr lang="pt-BR" smtClean="0"/>
-              <a:t>‹nº›</a:t>
+              <a:t>‹#›</a:t>
             </a:fld>
             <a:endParaRPr lang="pt-BR"/>
           </a:p>
@@ -2149,7 +2149,7 @@
           <a:p>
             <a:fld id="{89C4B140-6DEB-45EB-A5FE-2FE213A19AB6}" type="datetimeFigureOut">
               <a:rPr lang="pt-BR" smtClean="0"/>
-              <a:t>10/02/2020</a:t>
+              <a:t>05/03/2020</a:t>
             </a:fld>
             <a:endParaRPr lang="pt-BR"/>
           </a:p>
@@ -2207,7 +2207,7 @@
           <a:p>
             <a:fld id="{1BC5D9AF-0A3A-46C6-9823-3468E6F7B9BB}" type="slidenum">
               <a:rPr lang="pt-BR" smtClean="0"/>
-              <a:t>‹nº›</a:t>
+              <a:t>‹#›</a:t>
             </a:fld>
             <a:endParaRPr lang="pt-BR"/>
           </a:p>
@@ -2472,7 +2472,7 @@
           <a:p>
             <a:fld id="{89C4B140-6DEB-45EB-A5FE-2FE213A19AB6}" type="datetimeFigureOut">
               <a:rPr lang="pt-BR" smtClean="0"/>
-              <a:t>10/02/2020</a:t>
+              <a:t>05/03/2020</a:t>
             </a:fld>
             <a:endParaRPr lang="pt-BR"/>
           </a:p>
@@ -2530,7 +2530,7 @@
           <a:p>
             <a:fld id="{1BC5D9AF-0A3A-46C6-9823-3468E6F7B9BB}" type="slidenum">
               <a:rPr lang="pt-BR" smtClean="0"/>
-              <a:t>‹nº›</a:t>
+              <a:t>‹#›</a:t>
             </a:fld>
             <a:endParaRPr lang="pt-BR"/>
           </a:p>
@@ -2935,7 +2935,7 @@
           <a:p>
             <a:fld id="{89C4B140-6DEB-45EB-A5FE-2FE213A19AB6}" type="datetimeFigureOut">
               <a:rPr lang="pt-BR" smtClean="0"/>
-              <a:t>10/02/2020</a:t>
+              <a:t>05/03/2020</a:t>
             </a:fld>
             <a:endParaRPr lang="pt-BR"/>
           </a:p>
@@ -2993,7 +2993,7 @@
           <a:p>
             <a:fld id="{1BC5D9AF-0A3A-46C6-9823-3468E6F7B9BB}" type="slidenum">
               <a:rPr lang="pt-BR" smtClean="0"/>
-              <a:t>‹nº›</a:t>
+              <a:t>‹#›</a:t>
             </a:fld>
             <a:endParaRPr lang="pt-BR"/>
           </a:p>
@@ -3084,7 +3084,7 @@
           <a:p>
             <a:fld id="{89C4B140-6DEB-45EB-A5FE-2FE213A19AB6}" type="datetimeFigureOut">
               <a:rPr lang="pt-BR" smtClean="0"/>
-              <a:t>10/02/2020</a:t>
+              <a:t>05/03/2020</a:t>
             </a:fld>
             <a:endParaRPr lang="pt-BR"/>
           </a:p>
@@ -3142,7 +3142,7 @@
           <a:p>
             <a:fld id="{1BC5D9AF-0A3A-46C6-9823-3468E6F7B9BB}" type="slidenum">
               <a:rPr lang="pt-BR" smtClean="0"/>
-              <a:t>‹nº›</a:t>
+              <a:t>‹#›</a:t>
             </a:fld>
             <a:endParaRPr lang="pt-BR"/>
           </a:p>
@@ -3203,7 +3203,7 @@
           <a:p>
             <a:fld id="{89C4B140-6DEB-45EB-A5FE-2FE213A19AB6}" type="datetimeFigureOut">
               <a:rPr lang="pt-BR" smtClean="0"/>
-              <a:t>10/02/2020</a:t>
+              <a:t>05/03/2020</a:t>
             </a:fld>
             <a:endParaRPr lang="pt-BR"/>
           </a:p>
@@ -3261,7 +3261,7 @@
           <a:p>
             <a:fld id="{1BC5D9AF-0A3A-46C6-9823-3468E6F7B9BB}" type="slidenum">
               <a:rPr lang="pt-BR" smtClean="0"/>
-              <a:t>‹nº›</a:t>
+              <a:t>‹#›</a:t>
             </a:fld>
             <a:endParaRPr lang="pt-BR"/>
           </a:p>
@@ -3511,7 +3511,7 @@
           <a:p>
             <a:fld id="{89C4B140-6DEB-45EB-A5FE-2FE213A19AB6}" type="datetimeFigureOut">
               <a:rPr lang="pt-BR" smtClean="0"/>
-              <a:t>10/02/2020</a:t>
+              <a:t>05/03/2020</a:t>
             </a:fld>
             <a:endParaRPr lang="pt-BR"/>
           </a:p>
@@ -3569,7 +3569,7 @@
           <a:p>
             <a:fld id="{1BC5D9AF-0A3A-46C6-9823-3468E6F7B9BB}" type="slidenum">
               <a:rPr lang="pt-BR" smtClean="0"/>
-              <a:t>‹nº›</a:t>
+              <a:t>‹#›</a:t>
             </a:fld>
             <a:endParaRPr lang="pt-BR"/>
           </a:p>
@@ -3796,7 +3796,7 @@
           <a:p>
             <a:fld id="{89C4B140-6DEB-45EB-A5FE-2FE213A19AB6}" type="datetimeFigureOut">
               <a:rPr lang="pt-BR" smtClean="0"/>
-              <a:t>10/02/2020</a:t>
+              <a:t>05/03/2020</a:t>
             </a:fld>
             <a:endParaRPr lang="pt-BR"/>
           </a:p>
@@ -3854,7 +3854,7 @@
           <a:p>
             <a:fld id="{1BC5D9AF-0A3A-46C6-9823-3468E6F7B9BB}" type="slidenum">
               <a:rPr lang="pt-BR" smtClean="0"/>
-              <a:t>‹nº›</a:t>
+              <a:t>‹#›</a:t>
             </a:fld>
             <a:endParaRPr lang="pt-BR"/>
           </a:p>
@@ -4653,7 +4653,10 @@
           <a:lstStyle/>
           <a:p>
             <a:pPr algn="ctr"/>
-            <a:endParaRPr lang="pt-BR"/>
+            <a:r>
+              <a:rPr lang="pt-BR" dirty="0"/>
+              <a:t>3SI.</a:t>
+            </a:r>
           </a:p>
         </p:txBody>
       </p:sp>
@@ -4666,7 +4669,7 @@
         <p:spPr>
           <a:xfrm>
             <a:off x="735997" y="1052736"/>
-            <a:ext cx="5054717" cy="369332"/>
+            <a:ext cx="5054717" cy="646331"/>
           </a:xfrm>
           <a:prstGeom prst="rect">
             <a:avLst/>
@@ -4691,6 +4694,13 @@
               <a:rPr lang="pt-BR" b="1" dirty="0"/>
               <a:t>COMPLIANCE &amp; QUALITY ASSURANCE</a:t>
             </a:r>
+          </a:p>
+          <a:p>
+            <a:r>
+              <a:rPr lang="pt-BR" b="1"/>
+              <a:t>3SI.</a:t>
+            </a:r>
+            <a:endParaRPr lang="pt-BR" b="1" dirty="0"/>
           </a:p>
         </p:txBody>
       </p:sp>

</xml_diff>